<commit_message>
demo + slide před a za otázkami
</commit_message>
<xml_diff>
--- a/prezentace/xnovm288-obhajoba (sablona bc).pptx
+++ b/prezentace/xnovm288-obhajoba (sablona bc).pptx
@@ -5,10 +5,10 @@
     <p:sldMasterId id="2147483648" r:id="rId4"/>
   </p:sldMasterIdLst>
   <p:notesMasterIdLst>
-    <p:notesMasterId r:id="rId22"/>
+    <p:notesMasterId r:id="rId24"/>
   </p:notesMasterIdLst>
   <p:handoutMasterIdLst>
-    <p:handoutMasterId r:id="rId23"/>
+    <p:handoutMasterId r:id="rId25"/>
   </p:handoutMasterIdLst>
   <p:sldIdLst>
     <p:sldId id="257" r:id="rId5"/>
@@ -24,10 +24,12 @@
     <p:sldId id="275" r:id="rId15"/>
     <p:sldId id="264" r:id="rId16"/>
     <p:sldId id="276" r:id="rId17"/>
-    <p:sldId id="266" r:id="rId18"/>
-    <p:sldId id="267" r:id="rId19"/>
-    <p:sldId id="273" r:id="rId20"/>
-    <p:sldId id="274" r:id="rId21"/>
+    <p:sldId id="277" r:id="rId18"/>
+    <p:sldId id="266" r:id="rId19"/>
+    <p:sldId id="267" r:id="rId20"/>
+    <p:sldId id="273" r:id="rId21"/>
+    <p:sldId id="274" r:id="rId22"/>
+    <p:sldId id="278" r:id="rId23"/>
   </p:sldIdLst>
   <p:sldSz cx="18288000" cy="10287000"/>
   <p:notesSz cx="6797675" cy="9926638"/>
@@ -231,7 +233,7 @@
           <a:p>
             <a:fld id="{13B1C12D-995C-4CE2-B7E9-F2AF6EAEF7B3}" type="datetimeFigureOut">
               <a:rPr lang="cs-CZ" smtClean="0"/>
-              <a:t>12.05.2025</a:t>
+              <a:t>19.05.2025</a:t>
             </a:fld>
             <a:endParaRPr lang="cs-CZ"/>
           </a:p>
@@ -408,7 +410,7 @@
           <a:p>
             <a:fld id="{50103AD6-614C-4B13-AA75-3193C707D39E}" type="datetimeFigureOut">
               <a:rPr lang="cs-CZ" smtClean="0"/>
-              <a:t>12.05.2025</a:t>
+              <a:t>19.05.2025</a:t>
             </a:fld>
             <a:endParaRPr lang="cs-CZ"/>
           </a:p>
@@ -2133,7 +2135,7 @@
             <a:fld id="{7A3072F3-67BD-48D5-A6DA-38E4E24F7F23}" type="datetime3">
               <a:rPr lang="cs-CZ" smtClean="0"/>
               <a:pPr/>
-              <a:t>12/05/25</a:t>
+              <a:t>19/05/25</a:t>
             </a:fld>
             <a:endParaRPr lang="en-US" dirty="0"/>
           </a:p>
@@ -6443,7 +6445,7 @@
             <a:fld id="{7A3072F3-67BD-48D5-A6DA-38E4E24F7F23}" type="datetime3">
               <a:rPr lang="cs-CZ" smtClean="0"/>
               <a:pPr/>
-              <a:t>12/05/25</a:t>
+              <a:t>19/05/25</a:t>
             </a:fld>
             <a:endParaRPr lang="en-US" dirty="0"/>
           </a:p>
@@ -6890,7 +6892,7 @@
             <a:fld id="{7A3072F3-67BD-48D5-A6DA-38E4E24F7F23}" type="datetime3">
               <a:rPr lang="cs-CZ" smtClean="0"/>
               <a:pPr/>
-              <a:t>12/05/25</a:t>
+              <a:t>19/05/25</a:t>
             </a:fld>
             <a:endParaRPr lang="en-US" dirty="0"/>
           </a:p>
@@ -7337,7 +7339,7 @@
             <a:fld id="{7A3072F3-67BD-48D5-A6DA-38E4E24F7F23}" type="datetime3">
               <a:rPr lang="cs-CZ" smtClean="0"/>
               <a:pPr/>
-              <a:t>12/05/25</a:t>
+              <a:t>19/05/25</a:t>
             </a:fld>
             <a:endParaRPr lang="en-US" dirty="0"/>
           </a:p>
@@ -9343,7 +9345,7 @@
             <a:fld id="{7A3072F3-67BD-48D5-A6DA-38E4E24F7F23}" type="datetime3">
               <a:rPr lang="cs-CZ" smtClean="0"/>
               <a:pPr/>
-              <a:t>12/05/25</a:t>
+              <a:t>19/05/25</a:t>
             </a:fld>
             <a:endParaRPr lang="en-US" dirty="0"/>
           </a:p>
@@ -10827,7 +10829,13 @@
   <p:cSld>
     <p:spTree>
       <p:nvGrpSpPr>
-        <p:cNvPr id="1" name=""/>
+        <p:cNvPr id="1" name="">
+          <a:extLst>
+            <a:ext uri="{FF2B5EF4-FFF2-40B4-BE49-F238E27FC236}">
+              <a16:creationId xmlns:a16="http://schemas.microsoft.com/office/drawing/2014/main" id="{9C62AD2F-0F3C-7948-2C51-0A019A7BA1F7}"/>
+            </a:ext>
+          </a:extLst>
+        </p:cNvPr>
         <p:cNvGrpSpPr/>
         <p:nvPr/>
       </p:nvGrpSpPr>
@@ -10844,36 +10852,7 @@
           <p:cNvPr id="2" name="Zástupný text 1">
             <a:extLst>
               <a:ext uri="{FF2B5EF4-FFF2-40B4-BE49-F238E27FC236}">
-                <a16:creationId xmlns:a16="http://schemas.microsoft.com/office/drawing/2014/main" id="{32DEB359-6B80-3613-966B-FAA9301011F6}"/>
-              </a:ext>
-            </a:extLst>
-          </p:cNvPr>
-          <p:cNvSpPr>
-            <a:spLocks noGrp="1"/>
-          </p:cNvSpPr>
-          <p:nvPr>
-            <p:ph type="body" sz="quarter" idx="10"/>
-          </p:nvPr>
-        </p:nvSpPr>
-        <p:spPr/>
-        <p:txBody>
-          <a:bodyPr/>
-          <a:lstStyle/>
-          <a:p>
-            <a:r>
-              <a:rPr lang="cs-CZ" sz="8800" dirty="0"/>
-              <a:t>Otázka oponenta č.1</a:t>
-            </a:r>
-            <a:endParaRPr lang="cs-CZ" dirty="0"/>
-          </a:p>
-        </p:txBody>
-      </p:sp>
-      <p:sp>
-        <p:nvSpPr>
-          <p:cNvPr id="3" name="Zástupný text 2">
-            <a:extLst>
-              <a:ext uri="{FF2B5EF4-FFF2-40B4-BE49-F238E27FC236}">
-                <a16:creationId xmlns:a16="http://schemas.microsoft.com/office/drawing/2014/main" id="{3E850045-51D5-2556-4104-278A4FD24E04}"/>
+                <a16:creationId xmlns:a16="http://schemas.microsoft.com/office/drawing/2014/main" id="{22CE71D2-80A4-2976-6445-C0304403073B}"/>
               </a:ext>
             </a:extLst>
           </p:cNvPr>
@@ -10886,22 +10865,35 @@
         </p:nvSpPr>
         <p:spPr/>
         <p:txBody>
-          <a:bodyPr/>
+          <a:bodyPr>
+            <a:normAutofit/>
+          </a:bodyPr>
           <a:lstStyle/>
           <a:p>
             <a:r>
-              <a:rPr lang="pl-PL" sz="4400" b="1" dirty="0"/>
+              <a:rPr lang="pl-PL" sz="9600" dirty="0">
+                <a:solidFill>
+                  <a:srgbClr val="FFFF00"/>
+                </a:solidFill>
+              </a:rPr>
               <a:t>Návrh a realizace kontrolního systému na WiFi síti</a:t>
             </a:r>
           </a:p>
-        </p:txBody>
-      </p:sp>
-      <p:sp>
-        <p:nvSpPr>
-          <p:cNvPr id="5" name="Zástupný text 4">
-            <a:extLst>
-              <a:ext uri="{FF2B5EF4-FFF2-40B4-BE49-F238E27FC236}">
-                <a16:creationId xmlns:a16="http://schemas.microsoft.com/office/drawing/2014/main" id="{F6EF8A6A-A94B-E009-2904-00483D9F88E4}"/>
+          <a:p>
+            <a:r>
+              <a:rPr lang="cs-CZ" sz="7200" b="0" dirty="0"/>
+              <a:t>obhajoba diplomové práce</a:t>
+            </a:r>
+            <a:endParaRPr lang="cs-CZ" dirty="0"/>
+          </a:p>
+        </p:txBody>
+      </p:sp>
+      <p:sp>
+        <p:nvSpPr>
+          <p:cNvPr id="3" name="Zástupný symbol pro datum 2">
+            <a:extLst>
+              <a:ext uri="{FF2B5EF4-FFF2-40B4-BE49-F238E27FC236}">
+                <a16:creationId xmlns:a16="http://schemas.microsoft.com/office/drawing/2014/main" id="{0794FD87-F93D-5E1A-619C-EE045E26635F}"/>
               </a:ext>
             </a:extLst>
           </p:cNvPr>
@@ -10909,162 +10901,50 @@
             <a:spLocks noGrp="1"/>
           </p:cNvSpPr>
           <p:nvPr>
-            <p:ph type="body" sz="quarter" idx="16"/>
+            <p:ph type="dt" sz="half" idx="2"/>
           </p:nvPr>
         </p:nvSpPr>
-        <p:spPr>
-          <a:xfrm>
-            <a:off x="1079500" y="3422469"/>
-            <a:ext cx="15680146" cy="5821414"/>
-          </a:xfrm>
-        </p:spPr>
+        <p:spPr/>
         <p:txBody>
           <a:bodyPr/>
           <a:lstStyle/>
           <a:p>
-            <a:pPr marL="0" indent="0">
-              <a:buNone/>
-            </a:pPr>
-            <a:r>
-              <a:rPr lang="cs-CZ" sz="4800" dirty="0"/>
-              <a:t>„</a:t>
-            </a:r>
-            <a:r>
-              <a:rPr lang="cs-CZ" sz="4800" b="1" dirty="0">
-                <a:effectLst>
-                  <a:outerShdw blurRad="38100" dist="38100" dir="2700000" algn="tl">
-                    <a:srgbClr val="000000">
-                      <a:alpha val="43137"/>
-                    </a:srgbClr>
-                  </a:outerShdw>
-                </a:effectLst>
-              </a:rPr>
-              <a:t>Na str. 49 je uvedeno: „</a:t>
-            </a:r>
-            <a:r>
-              <a:rPr lang="cs-CZ" sz="4800" b="1" dirty="0" err="1">
-                <a:effectLst>
-                  <a:outerShdw blurRad="38100" dist="38100" dir="2700000" algn="tl">
-                    <a:srgbClr val="000000">
-                      <a:alpha val="43137"/>
-                    </a:srgbClr>
-                  </a:outerShdw>
-                </a:effectLst>
-              </a:rPr>
-              <a:t>For</a:t>
-            </a:r>
-            <a:r>
-              <a:rPr lang="cs-CZ" sz="4800" b="1" dirty="0">
-                <a:effectLst>
-                  <a:outerShdw blurRad="38100" dist="38100" dir="2700000" algn="tl">
-                    <a:srgbClr val="000000">
-                      <a:alpha val="43137"/>
-                    </a:srgbClr>
-                  </a:outerShdw>
-                </a:effectLst>
-              </a:rPr>
-              <a:t> byl zvolen místo </a:t>
-            </a:r>
-            <a:r>
-              <a:rPr lang="cs-CZ" sz="4800" b="1" dirty="0" err="1">
-                <a:effectLst>
-                  <a:outerShdw blurRad="38100" dist="38100" dir="2700000" algn="tl">
-                    <a:srgbClr val="000000">
-                      <a:alpha val="43137"/>
-                    </a:srgbClr>
-                  </a:outerShdw>
-                </a:effectLst>
-              </a:rPr>
-              <a:t>foreach</a:t>
-            </a:r>
-            <a:r>
-              <a:rPr lang="cs-CZ" sz="4800" b="1" dirty="0">
-                <a:effectLst>
-                  <a:outerShdw blurRad="38100" dist="38100" dir="2700000" algn="tl">
-                    <a:srgbClr val="000000">
-                      <a:alpha val="43137"/>
-                    </a:srgbClr>
-                  </a:outerShdw>
-                </a:effectLst>
-              </a:rPr>
-              <a:t> proto, aby bylo možné v chybové hlášce přesně určit místo, kde nastal problém.“ Vysvětlete rozdíl mezi příkazy </a:t>
-            </a:r>
-            <a:r>
-              <a:rPr lang="cs-CZ" sz="4800" b="1" dirty="0" err="1">
-                <a:effectLst>
-                  <a:outerShdw blurRad="38100" dist="38100" dir="2700000" algn="tl">
-                    <a:srgbClr val="000000">
-                      <a:alpha val="43137"/>
-                    </a:srgbClr>
-                  </a:outerShdw>
-                </a:effectLst>
-              </a:rPr>
-              <a:t>for</a:t>
-            </a:r>
-            <a:r>
-              <a:rPr lang="cs-CZ" sz="4800" b="1" dirty="0">
-                <a:effectLst>
-                  <a:outerShdw blurRad="38100" dist="38100" dir="2700000" algn="tl">
-                    <a:srgbClr val="000000">
-                      <a:alpha val="43137"/>
-                    </a:srgbClr>
-                  </a:outerShdw>
-                </a:effectLst>
-              </a:rPr>
-              <a:t> a </a:t>
-            </a:r>
-            <a:r>
-              <a:rPr lang="cs-CZ" sz="4800" b="1" dirty="0" err="1">
-                <a:effectLst>
-                  <a:outerShdw blurRad="38100" dist="38100" dir="2700000" algn="tl">
-                    <a:srgbClr val="000000">
-                      <a:alpha val="43137"/>
-                    </a:srgbClr>
-                  </a:outerShdw>
-                </a:effectLst>
-              </a:rPr>
-              <a:t>foreach</a:t>
-            </a:r>
-            <a:r>
-              <a:rPr lang="cs-CZ" sz="4800" b="1" dirty="0">
-                <a:effectLst>
-                  <a:outerShdw blurRad="38100" dist="38100" dir="2700000" algn="tl">
-                    <a:srgbClr val="000000">
-                      <a:alpha val="43137"/>
-                    </a:srgbClr>
-                  </a:outerShdw>
-                </a:effectLst>
-              </a:rPr>
-              <a:t> a proč druhý z nich neumožňuje přesné určení místa výskytu chyby. “</a:t>
-            </a:r>
-          </a:p>
-          <a:p>
-            <a:r>
-              <a:rPr lang="cs-CZ" b="1" dirty="0" err="1"/>
-              <a:t>For</a:t>
-            </a:r>
-            <a:r>
-              <a:rPr lang="cs-CZ" b="1" dirty="0"/>
-              <a:t> = k dispozici index</a:t>
-            </a:r>
-          </a:p>
-          <a:p>
-            <a:r>
-              <a:rPr lang="cs-CZ" b="1" dirty="0" err="1"/>
-              <a:t>Foreach</a:t>
-            </a:r>
-            <a:r>
-              <a:rPr lang="cs-CZ" b="1" dirty="0"/>
-              <a:t> = k dispozici prvek kolekce (v tomto případě znak)</a:t>
-            </a:r>
-          </a:p>
-          <a:p>
-            <a:endParaRPr lang="cs-CZ" b="1" dirty="0"/>
-          </a:p>
-          <a:p>
-            <a:pPr marL="0" indent="0" algn="just">
-              <a:buNone/>
-            </a:pPr>
+            <a:fld id="{7A3072F3-67BD-48D5-A6DA-38E4E24F7F23}" type="datetime3">
+              <a:rPr lang="cs-CZ" smtClean="0"/>
+              <a:pPr/>
+              <a:t>19/05/25</a:t>
+            </a:fld>
+            <a:endParaRPr lang="en-US" dirty="0"/>
+          </a:p>
+        </p:txBody>
+      </p:sp>
+      <p:sp>
+        <p:nvSpPr>
+          <p:cNvPr id="4" name="Zástupný text 3">
+            <a:extLst>
+              <a:ext uri="{FF2B5EF4-FFF2-40B4-BE49-F238E27FC236}">
+                <a16:creationId xmlns:a16="http://schemas.microsoft.com/office/drawing/2014/main" id="{73998AA9-846F-5577-62E1-03C4D0C239A3}"/>
+              </a:ext>
+            </a:extLst>
+          </p:cNvPr>
+          <p:cNvSpPr>
+            <a:spLocks noGrp="1"/>
+          </p:cNvSpPr>
+          <p:nvPr>
+            <p:ph type="body" sz="quarter" idx="11"/>
+          </p:nvPr>
+        </p:nvSpPr>
+        <p:spPr/>
+        <p:txBody>
+          <a:bodyPr/>
+          <a:lstStyle/>
+          <a:p>
+            <a:r>
+              <a:rPr lang="cs-CZ" dirty="0"/>
+              <a:t>Bc. Martin Novák</a:t>
+            </a:r>
+          </a:p>
+          <a:p>
             <a:endParaRPr lang="cs-CZ" dirty="0"/>
           </a:p>
         </p:txBody>
@@ -11072,7 +10952,7 @@
     </p:spTree>
     <p:extLst>
       <p:ext uri="{BB962C8B-B14F-4D97-AF65-F5344CB8AC3E}">
-        <p14:creationId xmlns:p14="http://schemas.microsoft.com/office/powerpoint/2010/main" val="481893954"/>
+        <p14:creationId xmlns:p14="http://schemas.microsoft.com/office/powerpoint/2010/main" val="3073231818"/>
       </p:ext>
     </p:extLst>
   </p:cSld>
@@ -11122,6 +11002,266 @@
           <a:p>
             <a:r>
               <a:rPr lang="cs-CZ" sz="8800" dirty="0"/>
+              <a:t>Otázka oponenta č.1</a:t>
+            </a:r>
+            <a:endParaRPr lang="cs-CZ" dirty="0"/>
+          </a:p>
+        </p:txBody>
+      </p:sp>
+      <p:sp>
+        <p:nvSpPr>
+          <p:cNvPr id="3" name="Zástupný text 2">
+            <a:extLst>
+              <a:ext uri="{FF2B5EF4-FFF2-40B4-BE49-F238E27FC236}">
+                <a16:creationId xmlns:a16="http://schemas.microsoft.com/office/drawing/2014/main" id="{3E850045-51D5-2556-4104-278A4FD24E04}"/>
+              </a:ext>
+            </a:extLst>
+          </p:cNvPr>
+          <p:cNvSpPr>
+            <a:spLocks noGrp="1"/>
+          </p:cNvSpPr>
+          <p:nvPr>
+            <p:ph type="body" sz="quarter" idx="12"/>
+          </p:nvPr>
+        </p:nvSpPr>
+        <p:spPr/>
+        <p:txBody>
+          <a:bodyPr/>
+          <a:lstStyle/>
+          <a:p>
+            <a:r>
+              <a:rPr lang="pl-PL" sz="4400" b="1" dirty="0"/>
+              <a:t>Návrh a realizace kontrolního systému na WiFi síti</a:t>
+            </a:r>
+          </a:p>
+        </p:txBody>
+      </p:sp>
+      <p:sp>
+        <p:nvSpPr>
+          <p:cNvPr id="5" name="Zástupný text 4">
+            <a:extLst>
+              <a:ext uri="{FF2B5EF4-FFF2-40B4-BE49-F238E27FC236}">
+                <a16:creationId xmlns:a16="http://schemas.microsoft.com/office/drawing/2014/main" id="{F6EF8A6A-A94B-E009-2904-00483D9F88E4}"/>
+              </a:ext>
+            </a:extLst>
+          </p:cNvPr>
+          <p:cNvSpPr>
+            <a:spLocks noGrp="1"/>
+          </p:cNvSpPr>
+          <p:nvPr>
+            <p:ph type="body" sz="quarter" idx="16"/>
+          </p:nvPr>
+        </p:nvSpPr>
+        <p:spPr>
+          <a:xfrm>
+            <a:off x="1079500" y="3422469"/>
+            <a:ext cx="15680146" cy="5821414"/>
+          </a:xfrm>
+        </p:spPr>
+        <p:txBody>
+          <a:bodyPr/>
+          <a:lstStyle/>
+          <a:p>
+            <a:pPr marL="0" indent="0">
+              <a:buNone/>
+            </a:pPr>
+            <a:r>
+              <a:rPr lang="cs-CZ" sz="4800" dirty="0"/>
+              <a:t>„</a:t>
+            </a:r>
+            <a:r>
+              <a:rPr lang="cs-CZ" sz="4800" b="1" dirty="0">
+                <a:effectLst>
+                  <a:outerShdw blurRad="38100" dist="38100" dir="2700000" algn="tl">
+                    <a:srgbClr val="000000">
+                      <a:alpha val="43137"/>
+                    </a:srgbClr>
+                  </a:outerShdw>
+                </a:effectLst>
+              </a:rPr>
+              <a:t>Na str. 49 je uvedeno: „</a:t>
+            </a:r>
+            <a:r>
+              <a:rPr lang="cs-CZ" sz="4800" b="1" dirty="0" err="1">
+                <a:effectLst>
+                  <a:outerShdw blurRad="38100" dist="38100" dir="2700000" algn="tl">
+                    <a:srgbClr val="000000">
+                      <a:alpha val="43137"/>
+                    </a:srgbClr>
+                  </a:outerShdw>
+                </a:effectLst>
+              </a:rPr>
+              <a:t>For</a:t>
+            </a:r>
+            <a:r>
+              <a:rPr lang="cs-CZ" sz="4800" b="1" dirty="0">
+                <a:effectLst>
+                  <a:outerShdw blurRad="38100" dist="38100" dir="2700000" algn="tl">
+                    <a:srgbClr val="000000">
+                      <a:alpha val="43137"/>
+                    </a:srgbClr>
+                  </a:outerShdw>
+                </a:effectLst>
+              </a:rPr>
+              <a:t> byl zvolen místo </a:t>
+            </a:r>
+            <a:r>
+              <a:rPr lang="cs-CZ" sz="4800" b="1" dirty="0" err="1">
+                <a:effectLst>
+                  <a:outerShdw blurRad="38100" dist="38100" dir="2700000" algn="tl">
+                    <a:srgbClr val="000000">
+                      <a:alpha val="43137"/>
+                    </a:srgbClr>
+                  </a:outerShdw>
+                </a:effectLst>
+              </a:rPr>
+              <a:t>foreach</a:t>
+            </a:r>
+            <a:r>
+              <a:rPr lang="cs-CZ" sz="4800" b="1" dirty="0">
+                <a:effectLst>
+                  <a:outerShdw blurRad="38100" dist="38100" dir="2700000" algn="tl">
+                    <a:srgbClr val="000000">
+                      <a:alpha val="43137"/>
+                    </a:srgbClr>
+                  </a:outerShdw>
+                </a:effectLst>
+              </a:rPr>
+              <a:t> proto, aby bylo možné v chybové hlášce přesně určit místo, kde nastal problém.“ Vysvětlete rozdíl mezi příkazy </a:t>
+            </a:r>
+            <a:r>
+              <a:rPr lang="cs-CZ" sz="4800" b="1" dirty="0" err="1">
+                <a:effectLst>
+                  <a:outerShdw blurRad="38100" dist="38100" dir="2700000" algn="tl">
+                    <a:srgbClr val="000000">
+                      <a:alpha val="43137"/>
+                    </a:srgbClr>
+                  </a:outerShdw>
+                </a:effectLst>
+              </a:rPr>
+              <a:t>for</a:t>
+            </a:r>
+            <a:r>
+              <a:rPr lang="cs-CZ" sz="4800" b="1" dirty="0">
+                <a:effectLst>
+                  <a:outerShdw blurRad="38100" dist="38100" dir="2700000" algn="tl">
+                    <a:srgbClr val="000000">
+                      <a:alpha val="43137"/>
+                    </a:srgbClr>
+                  </a:outerShdw>
+                </a:effectLst>
+              </a:rPr>
+              <a:t> a </a:t>
+            </a:r>
+            <a:r>
+              <a:rPr lang="cs-CZ" sz="4800" b="1" dirty="0" err="1">
+                <a:effectLst>
+                  <a:outerShdw blurRad="38100" dist="38100" dir="2700000" algn="tl">
+                    <a:srgbClr val="000000">
+                      <a:alpha val="43137"/>
+                    </a:srgbClr>
+                  </a:outerShdw>
+                </a:effectLst>
+              </a:rPr>
+              <a:t>foreach</a:t>
+            </a:r>
+            <a:r>
+              <a:rPr lang="cs-CZ" sz="4800" b="1" dirty="0">
+                <a:effectLst>
+                  <a:outerShdw blurRad="38100" dist="38100" dir="2700000" algn="tl">
+                    <a:srgbClr val="000000">
+                      <a:alpha val="43137"/>
+                    </a:srgbClr>
+                  </a:outerShdw>
+                </a:effectLst>
+              </a:rPr>
+              <a:t> a proč druhý z nich neumožňuje přesné určení místa výskytu chyby. “</a:t>
+            </a:r>
+          </a:p>
+          <a:p>
+            <a:r>
+              <a:rPr lang="cs-CZ" b="1" dirty="0" err="1"/>
+              <a:t>For</a:t>
+            </a:r>
+            <a:r>
+              <a:rPr lang="cs-CZ" b="1" dirty="0"/>
+              <a:t> = k dispozici index</a:t>
+            </a:r>
+          </a:p>
+          <a:p>
+            <a:r>
+              <a:rPr lang="cs-CZ" b="1" dirty="0" err="1"/>
+              <a:t>Foreach</a:t>
+            </a:r>
+            <a:r>
+              <a:rPr lang="cs-CZ" b="1" dirty="0"/>
+              <a:t> = k dispozici prvek kolekce (v tomto případě znak)</a:t>
+            </a:r>
+          </a:p>
+          <a:p>
+            <a:endParaRPr lang="cs-CZ" b="1" dirty="0"/>
+          </a:p>
+          <a:p>
+            <a:pPr marL="0" indent="0" algn="just">
+              <a:buNone/>
+            </a:pPr>
+            <a:endParaRPr lang="cs-CZ" dirty="0"/>
+          </a:p>
+        </p:txBody>
+      </p:sp>
+    </p:spTree>
+    <p:extLst>
+      <p:ext uri="{BB962C8B-B14F-4D97-AF65-F5344CB8AC3E}">
+        <p14:creationId xmlns:p14="http://schemas.microsoft.com/office/powerpoint/2010/main" val="481893954"/>
+      </p:ext>
+    </p:extLst>
+  </p:cSld>
+  <p:clrMapOvr>
+    <a:masterClrMapping/>
+  </p:clrMapOvr>
+</p:sld>
+</file>
+
+<file path=ppt/slides/slide16.xml><?xml version="1.0" encoding="utf-8"?>
+<p:sld xmlns:a="http://schemas.openxmlformats.org/drawingml/2006/main" xmlns:r="http://schemas.openxmlformats.org/officeDocument/2006/relationships" xmlns:p="http://schemas.openxmlformats.org/presentationml/2006/main">
+  <p:cSld>
+    <p:spTree>
+      <p:nvGrpSpPr>
+        <p:cNvPr id="1" name=""/>
+        <p:cNvGrpSpPr/>
+        <p:nvPr/>
+      </p:nvGrpSpPr>
+      <p:grpSpPr>
+        <a:xfrm>
+          <a:off x="0" y="0"/>
+          <a:ext cx="0" cy="0"/>
+          <a:chOff x="0" y="0"/>
+          <a:chExt cx="0" cy="0"/>
+        </a:xfrm>
+      </p:grpSpPr>
+      <p:sp>
+        <p:nvSpPr>
+          <p:cNvPr id="2" name="Zástupný text 1">
+            <a:extLst>
+              <a:ext uri="{FF2B5EF4-FFF2-40B4-BE49-F238E27FC236}">
+                <a16:creationId xmlns:a16="http://schemas.microsoft.com/office/drawing/2014/main" id="{32DEB359-6B80-3613-966B-FAA9301011F6}"/>
+              </a:ext>
+            </a:extLst>
+          </p:cNvPr>
+          <p:cNvSpPr>
+            <a:spLocks noGrp="1"/>
+          </p:cNvSpPr>
+          <p:nvPr>
+            <p:ph type="body" sz="quarter" idx="10"/>
+          </p:nvPr>
+        </p:nvSpPr>
+        <p:spPr/>
+        <p:txBody>
+          <a:bodyPr/>
+          <a:lstStyle/>
+          <a:p>
+            <a:r>
+              <a:rPr lang="cs-CZ" sz="8800" dirty="0"/>
               <a:t>Otázka oponenta č.2</a:t>
             </a:r>
             <a:endParaRPr lang="cs-CZ" dirty="0"/>
@@ -11248,7 +11388,7 @@
 </p:sld>
 </file>
 
-<file path=ppt/slides/slide16.xml><?xml version="1.0" encoding="utf-8"?>
+<file path=ppt/slides/slide17.xml><?xml version="1.0" encoding="utf-8"?>
 <p:sld xmlns:a="http://schemas.openxmlformats.org/drawingml/2006/main" xmlns:r="http://schemas.openxmlformats.org/officeDocument/2006/relationships" xmlns:p="http://schemas.openxmlformats.org/presentationml/2006/main">
   <p:cSld>
     <p:spTree>
@@ -11413,7 +11553,7 @@
 </p:sld>
 </file>
 
-<file path=ppt/slides/slide17.xml><?xml version="1.0" encoding="utf-8"?>
+<file path=ppt/slides/slide18.xml><?xml version="1.0" encoding="utf-8"?>
 <p:sld xmlns:a="http://schemas.openxmlformats.org/drawingml/2006/main" xmlns:r="http://schemas.openxmlformats.org/officeDocument/2006/relationships" xmlns:p="http://schemas.openxmlformats.org/presentationml/2006/main">
   <p:cSld>
     <p:spTree>
@@ -12277,6 +12417,144 @@
     <p:extLst>
       <p:ext uri="{BB962C8B-B14F-4D97-AF65-F5344CB8AC3E}">
         <p14:creationId xmlns:p14="http://schemas.microsoft.com/office/powerpoint/2010/main" val="1464903595"/>
+      </p:ext>
+    </p:extLst>
+  </p:cSld>
+  <p:clrMapOvr>
+    <a:masterClrMapping/>
+  </p:clrMapOvr>
+</p:sld>
+</file>
+
+<file path=ppt/slides/slide19.xml><?xml version="1.0" encoding="utf-8"?>
+<p:sld xmlns:a="http://schemas.openxmlformats.org/drawingml/2006/main" xmlns:r="http://schemas.openxmlformats.org/officeDocument/2006/relationships" xmlns:p="http://schemas.openxmlformats.org/presentationml/2006/main">
+  <p:cSld>
+    <p:spTree>
+      <p:nvGrpSpPr>
+        <p:cNvPr id="1" name="">
+          <a:extLst>
+            <a:ext uri="{FF2B5EF4-FFF2-40B4-BE49-F238E27FC236}">
+              <a16:creationId xmlns:a16="http://schemas.microsoft.com/office/drawing/2014/main" id="{2D4659E6-184D-D30B-1A58-D27CE6821488}"/>
+            </a:ext>
+          </a:extLst>
+        </p:cNvPr>
+        <p:cNvGrpSpPr/>
+        <p:nvPr/>
+      </p:nvGrpSpPr>
+      <p:grpSpPr>
+        <a:xfrm>
+          <a:off x="0" y="0"/>
+          <a:ext cx="0" cy="0"/>
+          <a:chOff x="0" y="0"/>
+          <a:chExt cx="0" cy="0"/>
+        </a:xfrm>
+      </p:grpSpPr>
+      <p:sp>
+        <p:nvSpPr>
+          <p:cNvPr id="2" name="Zástupný text 1">
+            <a:extLst>
+              <a:ext uri="{FF2B5EF4-FFF2-40B4-BE49-F238E27FC236}">
+                <a16:creationId xmlns:a16="http://schemas.microsoft.com/office/drawing/2014/main" id="{EC695F83-62C9-B05D-89F8-3AABEA965723}"/>
+              </a:ext>
+            </a:extLst>
+          </p:cNvPr>
+          <p:cNvSpPr>
+            <a:spLocks noGrp="1"/>
+          </p:cNvSpPr>
+          <p:nvPr>
+            <p:ph type="body" sz="quarter" idx="12"/>
+          </p:nvPr>
+        </p:nvSpPr>
+        <p:spPr/>
+        <p:txBody>
+          <a:bodyPr>
+            <a:normAutofit/>
+          </a:bodyPr>
+          <a:lstStyle/>
+          <a:p>
+            <a:r>
+              <a:rPr lang="pl-PL" sz="9600" dirty="0">
+                <a:solidFill>
+                  <a:srgbClr val="FFFF00"/>
+                </a:solidFill>
+              </a:rPr>
+              <a:t>Návrh a realizace kontrolního systému na WiFi síti</a:t>
+            </a:r>
+          </a:p>
+          <a:p>
+            <a:r>
+              <a:rPr lang="cs-CZ" sz="7200" b="0" dirty="0"/>
+              <a:t>obhajoba diplomové práce</a:t>
+            </a:r>
+            <a:endParaRPr lang="cs-CZ" dirty="0"/>
+          </a:p>
+        </p:txBody>
+      </p:sp>
+      <p:sp>
+        <p:nvSpPr>
+          <p:cNvPr id="3" name="Zástupný symbol pro datum 2">
+            <a:extLst>
+              <a:ext uri="{FF2B5EF4-FFF2-40B4-BE49-F238E27FC236}">
+                <a16:creationId xmlns:a16="http://schemas.microsoft.com/office/drawing/2014/main" id="{C30FA574-4DB1-5871-C193-EF989EC9CBCA}"/>
+              </a:ext>
+            </a:extLst>
+          </p:cNvPr>
+          <p:cNvSpPr>
+            <a:spLocks noGrp="1"/>
+          </p:cNvSpPr>
+          <p:nvPr>
+            <p:ph type="dt" sz="half" idx="2"/>
+          </p:nvPr>
+        </p:nvSpPr>
+        <p:spPr/>
+        <p:txBody>
+          <a:bodyPr/>
+          <a:lstStyle/>
+          <a:p>
+            <a:fld id="{7A3072F3-67BD-48D5-A6DA-38E4E24F7F23}" type="datetime3">
+              <a:rPr lang="cs-CZ" smtClean="0"/>
+              <a:pPr/>
+              <a:t>19/05/25</a:t>
+            </a:fld>
+            <a:endParaRPr lang="en-US" dirty="0"/>
+          </a:p>
+        </p:txBody>
+      </p:sp>
+      <p:sp>
+        <p:nvSpPr>
+          <p:cNvPr id="4" name="Zástupný text 3">
+            <a:extLst>
+              <a:ext uri="{FF2B5EF4-FFF2-40B4-BE49-F238E27FC236}">
+                <a16:creationId xmlns:a16="http://schemas.microsoft.com/office/drawing/2014/main" id="{94BF4324-1B38-1C4F-D0BF-CF4349AB3055}"/>
+              </a:ext>
+            </a:extLst>
+          </p:cNvPr>
+          <p:cNvSpPr>
+            <a:spLocks noGrp="1"/>
+          </p:cNvSpPr>
+          <p:nvPr>
+            <p:ph type="body" sz="quarter" idx="11"/>
+          </p:nvPr>
+        </p:nvSpPr>
+        <p:spPr/>
+        <p:txBody>
+          <a:bodyPr/>
+          <a:lstStyle/>
+          <a:p>
+            <a:r>
+              <a:rPr lang="cs-CZ" dirty="0"/>
+              <a:t>Bc. Martin Novák</a:t>
+            </a:r>
+          </a:p>
+          <a:p>
+            <a:endParaRPr lang="cs-CZ" dirty="0"/>
+          </a:p>
+        </p:txBody>
+      </p:sp>
+    </p:spTree>
+    <p:extLst>
+      <p:ext uri="{BB962C8B-B14F-4D97-AF65-F5344CB8AC3E}">
+        <p14:creationId xmlns:p14="http://schemas.microsoft.com/office/powerpoint/2010/main" val="3413663657"/>
       </p:ext>
     </p:extLst>
   </p:cSld>

</xml_diff>